<commit_message>
Updated documentation to read permissions from shared doc
</commit_message>
<xml_diff>
--- a/website/diagrams/maester-diagrams.pptx
+++ b/website/diagrams/maester-diagrams.pptx
@@ -259,7 +259,7 @@
               <a:rPr lang="en-US" smtClean="0"/>
               <a:t>4/19/24</a:t>
             </a:fld>
-            <a:endParaRPr lang="en-US"/>
+            <a:endParaRPr lang="en-US" dirty="0"/>
           </a:p>
         </p:txBody>
       </p:sp>
@@ -284,7 +284,7 @@
           <a:bodyPr/>
           <a:lstStyle/>
           <a:p>
-            <a:endParaRPr lang="en-US"/>
+            <a:endParaRPr lang="en-US" dirty="0"/>
           </a:p>
         </p:txBody>
       </p:sp>
@@ -313,7 +313,7 @@
               <a:rPr lang="en-US" smtClean="0"/>
               <a:t>‹#›</a:t>
             </a:fld>
-            <a:endParaRPr lang="en-US"/>
+            <a:endParaRPr lang="en-US" dirty="0"/>
           </a:p>
         </p:txBody>
       </p:sp>
@@ -459,7 +459,7 @@
               <a:rPr lang="en-US" smtClean="0"/>
               <a:t>4/19/24</a:t>
             </a:fld>
-            <a:endParaRPr lang="en-US"/>
+            <a:endParaRPr lang="en-US" dirty="0"/>
           </a:p>
         </p:txBody>
       </p:sp>
@@ -484,7 +484,7 @@
           <a:bodyPr/>
           <a:lstStyle/>
           <a:p>
-            <a:endParaRPr lang="en-US"/>
+            <a:endParaRPr lang="en-US" dirty="0"/>
           </a:p>
         </p:txBody>
       </p:sp>
@@ -513,7 +513,7 @@
               <a:rPr lang="en-US" smtClean="0"/>
               <a:t>‹#›</a:t>
             </a:fld>
-            <a:endParaRPr lang="en-US"/>
+            <a:endParaRPr lang="en-US" dirty="0"/>
           </a:p>
         </p:txBody>
       </p:sp>
@@ -669,7 +669,7 @@
               <a:rPr lang="en-US" smtClean="0"/>
               <a:t>4/19/24</a:t>
             </a:fld>
-            <a:endParaRPr lang="en-US"/>
+            <a:endParaRPr lang="en-US" dirty="0"/>
           </a:p>
         </p:txBody>
       </p:sp>
@@ -694,7 +694,7 @@
           <a:bodyPr/>
           <a:lstStyle/>
           <a:p>
-            <a:endParaRPr lang="en-US"/>
+            <a:endParaRPr lang="en-US" dirty="0"/>
           </a:p>
         </p:txBody>
       </p:sp>
@@ -723,7 +723,7 @@
               <a:rPr lang="en-US" smtClean="0"/>
               <a:t>‹#›</a:t>
             </a:fld>
-            <a:endParaRPr lang="en-US"/>
+            <a:endParaRPr lang="en-US" dirty="0"/>
           </a:p>
         </p:txBody>
       </p:sp>
@@ -869,7 +869,7 @@
               <a:rPr lang="en-US" smtClean="0"/>
               <a:t>4/19/24</a:t>
             </a:fld>
-            <a:endParaRPr lang="en-US"/>
+            <a:endParaRPr lang="en-US" dirty="0"/>
           </a:p>
         </p:txBody>
       </p:sp>
@@ -894,7 +894,7 @@
           <a:bodyPr/>
           <a:lstStyle/>
           <a:p>
-            <a:endParaRPr lang="en-US"/>
+            <a:endParaRPr lang="en-US" dirty="0"/>
           </a:p>
         </p:txBody>
       </p:sp>
@@ -923,7 +923,7 @@
               <a:rPr lang="en-US" smtClean="0"/>
               <a:t>‹#›</a:t>
             </a:fld>
-            <a:endParaRPr lang="en-US"/>
+            <a:endParaRPr lang="en-US" dirty="0"/>
           </a:p>
         </p:txBody>
       </p:sp>
@@ -1145,7 +1145,7 @@
               <a:rPr lang="en-US" smtClean="0"/>
               <a:t>4/19/24</a:t>
             </a:fld>
-            <a:endParaRPr lang="en-US"/>
+            <a:endParaRPr lang="en-US" dirty="0"/>
           </a:p>
         </p:txBody>
       </p:sp>
@@ -1170,7 +1170,7 @@
           <a:bodyPr/>
           <a:lstStyle/>
           <a:p>
-            <a:endParaRPr lang="en-US"/>
+            <a:endParaRPr lang="en-US" dirty="0"/>
           </a:p>
         </p:txBody>
       </p:sp>
@@ -1199,7 +1199,7 @@
               <a:rPr lang="en-US" smtClean="0"/>
               <a:t>‹#›</a:t>
             </a:fld>
-            <a:endParaRPr lang="en-US"/>
+            <a:endParaRPr lang="en-US" dirty="0"/>
           </a:p>
         </p:txBody>
       </p:sp>
@@ -1413,7 +1413,7 @@
               <a:rPr lang="en-US" smtClean="0"/>
               <a:t>4/19/24</a:t>
             </a:fld>
-            <a:endParaRPr lang="en-US"/>
+            <a:endParaRPr lang="en-US" dirty="0"/>
           </a:p>
         </p:txBody>
       </p:sp>
@@ -1438,7 +1438,7 @@
           <a:bodyPr/>
           <a:lstStyle/>
           <a:p>
-            <a:endParaRPr lang="en-US"/>
+            <a:endParaRPr lang="en-US" dirty="0"/>
           </a:p>
         </p:txBody>
       </p:sp>
@@ -1467,7 +1467,7 @@
               <a:rPr lang="en-US" smtClean="0"/>
               <a:t>‹#›</a:t>
             </a:fld>
-            <a:endParaRPr lang="en-US"/>
+            <a:endParaRPr lang="en-US" dirty="0"/>
           </a:p>
         </p:txBody>
       </p:sp>
@@ -1828,7 +1828,7 @@
               <a:rPr lang="en-US" smtClean="0"/>
               <a:t>4/19/24</a:t>
             </a:fld>
-            <a:endParaRPr lang="en-US"/>
+            <a:endParaRPr lang="en-US" dirty="0"/>
           </a:p>
         </p:txBody>
       </p:sp>
@@ -1853,7 +1853,7 @@
           <a:bodyPr/>
           <a:lstStyle/>
           <a:p>
-            <a:endParaRPr lang="en-US"/>
+            <a:endParaRPr lang="en-US" dirty="0"/>
           </a:p>
         </p:txBody>
       </p:sp>
@@ -1882,7 +1882,7 @@
               <a:rPr lang="en-US" smtClean="0"/>
               <a:t>‹#›</a:t>
             </a:fld>
-            <a:endParaRPr lang="en-US"/>
+            <a:endParaRPr lang="en-US" dirty="0"/>
           </a:p>
         </p:txBody>
       </p:sp>
@@ -1970,7 +1970,7 @@
               <a:rPr lang="en-US" smtClean="0"/>
               <a:t>4/19/24</a:t>
             </a:fld>
-            <a:endParaRPr lang="en-US"/>
+            <a:endParaRPr lang="en-US" dirty="0"/>
           </a:p>
         </p:txBody>
       </p:sp>
@@ -1995,7 +1995,7 @@
           <a:bodyPr/>
           <a:lstStyle/>
           <a:p>
-            <a:endParaRPr lang="en-US"/>
+            <a:endParaRPr lang="en-US" dirty="0"/>
           </a:p>
         </p:txBody>
       </p:sp>
@@ -2024,7 +2024,7 @@
               <a:rPr lang="en-US" smtClean="0"/>
               <a:t>‹#›</a:t>
             </a:fld>
-            <a:endParaRPr lang="en-US"/>
+            <a:endParaRPr lang="en-US" dirty="0"/>
           </a:p>
         </p:txBody>
       </p:sp>
@@ -2083,7 +2083,7 @@
               <a:rPr lang="en-US" smtClean="0"/>
               <a:t>4/19/24</a:t>
             </a:fld>
-            <a:endParaRPr lang="en-US"/>
+            <a:endParaRPr lang="en-US" dirty="0"/>
           </a:p>
         </p:txBody>
       </p:sp>
@@ -2108,7 +2108,7 @@
           <a:bodyPr/>
           <a:lstStyle/>
           <a:p>
-            <a:endParaRPr lang="en-US"/>
+            <a:endParaRPr lang="en-US" dirty="0"/>
           </a:p>
         </p:txBody>
       </p:sp>
@@ -2137,7 +2137,7 @@
               <a:rPr lang="en-US" smtClean="0"/>
               <a:t>‹#›</a:t>
             </a:fld>
-            <a:endParaRPr lang="en-US"/>
+            <a:endParaRPr lang="en-US" dirty="0"/>
           </a:p>
         </p:txBody>
       </p:sp>
@@ -2396,7 +2396,7 @@
               <a:rPr lang="en-US" smtClean="0"/>
               <a:t>4/19/24</a:t>
             </a:fld>
-            <a:endParaRPr lang="en-US"/>
+            <a:endParaRPr lang="en-US" dirty="0"/>
           </a:p>
         </p:txBody>
       </p:sp>
@@ -2421,7 +2421,7 @@
           <a:bodyPr/>
           <a:lstStyle/>
           <a:p>
-            <a:endParaRPr lang="en-US"/>
+            <a:endParaRPr lang="en-US" dirty="0"/>
           </a:p>
         </p:txBody>
       </p:sp>
@@ -2450,7 +2450,7 @@
               <a:rPr lang="en-US" smtClean="0"/>
               <a:t>‹#›</a:t>
             </a:fld>
-            <a:endParaRPr lang="en-US"/>
+            <a:endParaRPr lang="en-US" dirty="0"/>
           </a:p>
         </p:txBody>
       </p:sp>
@@ -2585,7 +2585,7 @@
             </a:lvl9pPr>
           </a:lstStyle>
           <a:p>
-            <a:endParaRPr lang="en-US"/>
+            <a:endParaRPr lang="en-US" dirty="0"/>
           </a:p>
         </p:txBody>
       </p:sp>
@@ -2685,7 +2685,7 @@
               <a:rPr lang="en-US" smtClean="0"/>
               <a:t>4/19/24</a:t>
             </a:fld>
-            <a:endParaRPr lang="en-US"/>
+            <a:endParaRPr lang="en-US" dirty="0"/>
           </a:p>
         </p:txBody>
       </p:sp>
@@ -2710,7 +2710,7 @@
           <a:bodyPr/>
           <a:lstStyle/>
           <a:p>
-            <a:endParaRPr lang="en-US"/>
+            <a:endParaRPr lang="en-US" dirty="0"/>
           </a:p>
         </p:txBody>
       </p:sp>
@@ -2739,7 +2739,7 @@
               <a:rPr lang="en-US" smtClean="0"/>
               <a:t>‹#›</a:t>
             </a:fld>
-            <a:endParaRPr lang="en-US"/>
+            <a:endParaRPr lang="en-US" dirty="0"/>
           </a:p>
         </p:txBody>
       </p:sp>
@@ -2928,7 +2928,7 @@
               <a:rPr lang="en-US" smtClean="0"/>
               <a:t>4/19/24</a:t>
             </a:fld>
-            <a:endParaRPr lang="en-US"/>
+            <a:endParaRPr lang="en-US" dirty="0"/>
           </a:p>
         </p:txBody>
       </p:sp>
@@ -2971,7 +2971,7 @@
             </a:lvl1pPr>
           </a:lstStyle>
           <a:p>
-            <a:endParaRPr lang="en-US"/>
+            <a:endParaRPr lang="en-US" dirty="0"/>
           </a:p>
         </p:txBody>
       </p:sp>
@@ -3018,7 +3018,7 @@
               <a:rPr lang="en-US" smtClean="0"/>
               <a:t>‹#›</a:t>
             </a:fld>
-            <a:endParaRPr lang="en-US"/>
+            <a:endParaRPr lang="en-US" dirty="0"/>
           </a:p>
         </p:txBody>
       </p:sp>
@@ -3392,7 +3392,7 @@
           <a:bodyPr/>
           <a:lstStyle/>
           <a:p>
-            <a:endParaRPr lang="en-US"/>
+            <a:endParaRPr lang="en-US" dirty="0"/>
           </a:p>
         </p:txBody>
       </p:sp>
@@ -3563,7 +3563,7 @@
             <a:lstStyle/>
             <a:p>
               <a:pPr algn="ctr"/>
-              <a:endParaRPr lang="en-US"/>
+              <a:endParaRPr lang="en-US" dirty="0"/>
             </a:p>
           </p:txBody>
         </p:sp>
@@ -3632,33 +3632,20 @@
             <a:lstStyle/>
             <a:p>
               <a:r>
-                <a:rPr lang="en-US" b="1" dirty="0" err="1"/>
+                <a:rPr lang="en-US" b="1" dirty="0"/>
                 <a:t>EidscaConfig.json</a:t>
               </a:r>
-              <a:endParaRPr lang="en-US" b="1" dirty="0"/>
             </a:p>
             <a:p>
               <a:r>
                 <a:rPr lang="en-US" sz="1400" i="1" dirty="0"/>
-                <a:t>Cloud-</a:t>
-              </a:r>
-              <a:r>
-                <a:rPr lang="en-US" sz="1400" i="1" dirty="0" err="1"/>
-                <a:t>Architekt</a:t>
-              </a:r>
-              <a:r>
-                <a:rPr lang="en-US" sz="1400" i="1" dirty="0"/>
-                <a:t>/</a:t>
+                <a:t>Cloud-Architekt/</a:t>
               </a:r>
             </a:p>
             <a:p>
               <a:r>
-                <a:rPr lang="en-US" sz="1400" i="1" dirty="0" err="1"/>
-                <a:t>AzureAD</a:t>
-              </a:r>
-              <a:r>
                 <a:rPr lang="en-US" sz="1400" i="1" dirty="0"/>
-                <a:t>-Attack-Defense</a:t>
+                <a:t>AzureAD-Attack-Defense</a:t>
               </a:r>
             </a:p>
           </p:txBody>
@@ -3815,20 +3802,8 @@
             </a:p>
             <a:p>
               <a:r>
-                <a:rPr lang="en-US" sz="1400" dirty="0" err="1"/>
-                <a:t>maester</a:t>
-              </a:r>
-              <a:r>
                 <a:rPr lang="en-US" sz="1400" dirty="0"/>
-                <a:t>/build/</a:t>
-              </a:r>
-              <a:r>
-                <a:rPr lang="en-US" sz="1400" dirty="0" err="1"/>
-                <a:t>eidsca</a:t>
-              </a:r>
-              <a:r>
-                <a:rPr lang="en-US" sz="1400" dirty="0"/>
-                <a:t>/</a:t>
+                <a:t>maester/build/eidsca/</a:t>
               </a:r>
             </a:p>
           </p:txBody>
@@ -3885,7 +3860,7 @@
             <a:lstStyle/>
             <a:p>
               <a:pPr algn="ctr"/>
-              <a:endParaRPr lang="en-US"/>
+              <a:endParaRPr lang="en-US" dirty="0"/>
             </a:p>
           </p:txBody>
         </p:sp>

</xml_diff>